<commit_message>
added reading and week 2 slide updates
</commit_message>
<xml_diff>
--- a/slides/Week2__21_Assessment_Fundamentals.pptx
+++ b/slides/Week2__21_Assessment_Fundamentals.pptx
@@ -14383,7 +14383,7 @@
           <a:p>
             <a:fld id="{55C38658-7CB9-E440-832B-263D86A72D82}" type="datetimeFigureOut">
               <a:rPr lang="en-US" smtClean="0"/>
-              <a:t>12/14/20</a:t>
+              <a:t>12/22/20</a:t>
             </a:fld>
             <a:endParaRPr lang="en-US"/>
           </a:p>
@@ -18809,7 +18809,7 @@
               </a14:hiddenLine>
             </a:ext>
             <a:ext uri="{FAA26D3D-D897-4be2-8F04-BA451C77F1D7}">
-              <ma14:placeholderFlag xmlns="" xmlns:ma14="http://schemas.microsoft.com/office/mac/drawingml/2011/main" val="1"/>
+              <ma14:placeholderFlag xmlns:ma14="http://schemas.microsoft.com/office/mac/drawingml/2011/main" xmlns="" val="1"/>
             </a:ext>
           </a:extLst>
         </p:spPr>
@@ -18949,7 +18949,7 @@
               </a14:hiddenLine>
             </a:ext>
             <a:ext uri="{FAA26D3D-D897-4be2-8F04-BA451C77F1D7}">
-              <ma14:placeholderFlag xmlns:ma14="http://schemas.microsoft.com/office/mac/drawingml/2011/main" xmlns="" val="1"/>
+              <ma14:placeholderFlag xmlns="" xmlns:ma14="http://schemas.microsoft.com/office/mac/drawingml/2011/main" val="1"/>
             </a:ext>
           </a:extLst>
         </p:spPr>
@@ -19327,7 +19327,7 @@
           <a:p>
             <a:fld id="{E76F26E0-2ED5-1B4C-9D44-9364A5F1EF5B}" type="datetimeFigureOut">
               <a:rPr lang="en-US" smtClean="0"/>
-              <a:t>12/14/20</a:t>
+              <a:t>12/22/20</a:t>
             </a:fld>
             <a:endParaRPr lang="en-US"/>
           </a:p>
@@ -19397,7 +19397,7 @@
               </a14:hiddenLine>
             </a:ext>
             <a:ext uri="{FAA26D3D-D897-4be2-8F04-BA451C77F1D7}">
-              <ma14:placeholderFlag xmlns:ma14="http://schemas.microsoft.com/office/mac/drawingml/2011/main" xmlns="" val="1"/>
+              <ma14:placeholderFlag xmlns="" xmlns:ma14="http://schemas.microsoft.com/office/mac/drawingml/2011/main" val="1"/>
             </a:ext>
           </a:extLst>
         </p:spPr>
@@ -19531,7 +19531,7 @@
           <a:p>
             <a:fld id="{E76F26E0-2ED5-1B4C-9D44-9364A5F1EF5B}" type="datetimeFigureOut">
               <a:rPr lang="en-US" smtClean="0"/>
-              <a:t>12/14/20</a:t>
+              <a:t>12/22/20</a:t>
             </a:fld>
             <a:endParaRPr lang="en-US"/>
           </a:p>
@@ -19944,7 +19944,7 @@
           <a:p>
             <a:fld id="{E76F26E0-2ED5-1B4C-9D44-9364A5F1EF5B}" type="datetimeFigureOut">
               <a:rPr lang="en-US" smtClean="0"/>
-              <a:t>12/14/20</a:t>
+              <a:t>12/22/20</a:t>
             </a:fld>
             <a:endParaRPr lang="en-US"/>
           </a:p>
@@ -21696,7 +21696,7 @@
               </a14:hiddenLine>
             </a:ext>
             <a:ext uri="{FAA26D3D-D897-4be2-8F04-BA451C77F1D7}">
-              <ma14:placeholderFlag xmlns:ma14="http://schemas.microsoft.com/office/mac/drawingml/2011/main" xmlns="" val="1"/>
+              <ma14:placeholderFlag xmlns="" xmlns:ma14="http://schemas.microsoft.com/office/mac/drawingml/2011/main" val="1"/>
             </a:ext>
           </a:extLst>
         </p:spPr>
@@ -22233,7 +22233,7 @@
               </a14:hiddenLine>
             </a:ext>
             <a:ext uri="{FAA26D3D-D897-4be2-8F04-BA451C77F1D7}">
-              <ma14:placeholderFlag xmlns:ma14="http://schemas.microsoft.com/office/mac/drawingml/2011/main" xmlns="" val="1"/>
+              <ma14:placeholderFlag xmlns="" xmlns:ma14="http://schemas.microsoft.com/office/mac/drawingml/2011/main" val="1"/>
             </a:ext>
           </a:extLst>
         </p:spPr>
@@ -22763,7 +22763,7 @@
           <a:p>
             <a:fld id="{E76F26E0-2ED5-1B4C-9D44-9364A5F1EF5B}" type="datetimeFigureOut">
               <a:rPr lang="en-US" smtClean="0"/>
-              <a:t>12/14/20</a:t>
+              <a:t>12/22/20</a:t>
             </a:fld>
             <a:endParaRPr lang="en-US"/>
           </a:p>
@@ -23012,7 +23012,7 @@
           <a:p>
             <a:fld id="{E76F26E0-2ED5-1B4C-9D44-9364A5F1EF5B}" type="datetimeFigureOut">
               <a:rPr lang="en-US" smtClean="0"/>
-              <a:t>12/14/20</a:t>
+              <a:t>12/22/20</a:t>
             </a:fld>
             <a:endParaRPr lang="en-US"/>
           </a:p>
@@ -23082,7 +23082,7 @@
               </a14:hiddenLine>
             </a:ext>
             <a:ext uri="{FAA26D3D-D897-4be2-8F04-BA451C77F1D7}">
-              <ma14:placeholderFlag xmlns:ma14="http://schemas.microsoft.com/office/mac/drawingml/2011/main" xmlns="" val="1"/>
+              <ma14:placeholderFlag xmlns="" xmlns:ma14="http://schemas.microsoft.com/office/mac/drawingml/2011/main" val="1"/>
             </a:ext>
           </a:extLst>
         </p:spPr>
@@ -23144,7 +23144,7 @@
               </a14:hiddenLine>
             </a:ext>
             <a:ext uri="{FAA26D3D-D897-4be2-8F04-BA451C77F1D7}">
-              <ma14:placeholderFlag xmlns:ma14="http://schemas.microsoft.com/office/mac/drawingml/2011/main" xmlns="" val="1"/>
+              <ma14:placeholderFlag xmlns="" xmlns:ma14="http://schemas.microsoft.com/office/mac/drawingml/2011/main" val="1"/>
             </a:ext>
           </a:extLst>
         </p:spPr>
@@ -23244,7 +23244,7 @@
           <a:p>
             <a:fld id="{E76F26E0-2ED5-1B4C-9D44-9364A5F1EF5B}" type="datetimeFigureOut">
               <a:rPr lang="en-US" smtClean="0"/>
-              <a:t>12/14/20</a:t>
+              <a:t>12/22/20</a:t>
             </a:fld>
             <a:endParaRPr lang="en-US"/>
           </a:p>
@@ -23314,7 +23314,7 @@
               </a14:hiddenLine>
             </a:ext>
             <a:ext uri="{FAA26D3D-D897-4be2-8F04-BA451C77F1D7}">
-              <ma14:placeholderFlag xmlns:ma14="http://schemas.microsoft.com/office/mac/drawingml/2011/main" xmlns="" val="1"/>
+              <ma14:placeholderFlag xmlns="" xmlns:ma14="http://schemas.microsoft.com/office/mac/drawingml/2011/main" val="1"/>
             </a:ext>
           </a:extLst>
         </p:spPr>
@@ -23376,7 +23376,7 @@
               </a14:hiddenLine>
             </a:ext>
             <a:ext uri="{FAA26D3D-D897-4be2-8F04-BA451C77F1D7}">
-              <ma14:placeholderFlag xmlns:ma14="http://schemas.microsoft.com/office/mac/drawingml/2011/main" xmlns="" val="1"/>
+              <ma14:placeholderFlag xmlns="" xmlns:ma14="http://schemas.microsoft.com/office/mac/drawingml/2011/main" val="1"/>
             </a:ext>
           </a:extLst>
         </p:spPr>
@@ -23560,7 +23560,7 @@
           <a:p>
             <a:fld id="{E76F26E0-2ED5-1B4C-9D44-9364A5F1EF5B}" type="datetimeFigureOut">
               <a:rPr lang="en-US" smtClean="0"/>
-              <a:t>12/14/20</a:t>
+              <a:t>12/22/20</a:t>
             </a:fld>
             <a:endParaRPr lang="en-US"/>
           </a:p>
@@ -23630,7 +23630,7 @@
               </a14:hiddenLine>
             </a:ext>
             <a:ext uri="{FAA26D3D-D897-4be2-8F04-BA451C77F1D7}">
-              <ma14:placeholderFlag xmlns:ma14="http://schemas.microsoft.com/office/mac/drawingml/2011/main" xmlns="" val="1"/>
+              <ma14:placeholderFlag xmlns="" xmlns:ma14="http://schemas.microsoft.com/office/mac/drawingml/2011/main" val="1"/>
             </a:ext>
           </a:extLst>
         </p:spPr>
@@ -23692,7 +23692,7 @@
               </a14:hiddenLine>
             </a:ext>
             <a:ext uri="{FAA26D3D-D897-4be2-8F04-BA451C77F1D7}">
-              <ma14:placeholderFlag xmlns:ma14="http://schemas.microsoft.com/office/mac/drawingml/2011/main" xmlns="" val="1"/>
+              <ma14:placeholderFlag xmlns="" xmlns:ma14="http://schemas.microsoft.com/office/mac/drawingml/2011/main" val="1"/>
             </a:ext>
           </a:extLst>
         </p:spPr>
@@ -23792,7 +23792,7 @@
           <a:p>
             <a:fld id="{E76F26E0-2ED5-1B4C-9D44-9364A5F1EF5B}" type="datetimeFigureOut">
               <a:rPr lang="en-US" smtClean="0"/>
-              <a:t>12/14/20</a:t>
+              <a:t>12/22/20</a:t>
             </a:fld>
             <a:endParaRPr lang="en-US"/>
           </a:p>
@@ -23862,7 +23862,7 @@
               </a14:hiddenLine>
             </a:ext>
             <a:ext uri="{FAA26D3D-D897-4be2-8F04-BA451C77F1D7}">
-              <ma14:placeholderFlag xmlns:ma14="http://schemas.microsoft.com/office/mac/drawingml/2011/main" xmlns="" val="1"/>
+              <ma14:placeholderFlag xmlns="" xmlns:ma14="http://schemas.microsoft.com/office/mac/drawingml/2011/main" val="1"/>
             </a:ext>
           </a:extLst>
         </p:spPr>
@@ -23924,7 +23924,7 @@
               </a14:hiddenLine>
             </a:ext>
             <a:ext uri="{FAA26D3D-D897-4be2-8F04-BA451C77F1D7}">
-              <ma14:placeholderFlag xmlns:ma14="http://schemas.microsoft.com/office/mac/drawingml/2011/main" xmlns="" val="1"/>
+              <ma14:placeholderFlag xmlns="" xmlns:ma14="http://schemas.microsoft.com/office/mac/drawingml/2011/main" val="1"/>
             </a:ext>
           </a:extLst>
         </p:spPr>
@@ -24014,7 +24014,7 @@
               </a14:hiddenLine>
             </a:ext>
             <a:ext uri="{FAA26D3D-D897-4be2-8F04-BA451C77F1D7}">
-              <ma14:placeholderFlag xmlns:ma14="http://schemas.microsoft.com/office/mac/drawingml/2011/main" xmlns="" val="1"/>
+              <ma14:placeholderFlag xmlns="" xmlns:ma14="http://schemas.microsoft.com/office/mac/drawingml/2011/main" val="1"/>
             </a:ext>
           </a:extLst>
         </p:spPr>
@@ -24110,7 +24110,7 @@
           <a:p>
             <a:fld id="{E76F26E0-2ED5-1B4C-9D44-9364A5F1EF5B}" type="datetimeFigureOut">
               <a:rPr lang="en-US" smtClean="0"/>
-              <a:t>12/14/20</a:t>
+              <a:t>12/22/20</a:t>
             </a:fld>
             <a:endParaRPr lang="en-US"/>
           </a:p>
@@ -24547,7 +24547,7 @@
               </a14:hiddenLine>
             </a:ext>
             <a:ext uri="{FAA26D3D-D897-4be2-8F04-BA451C77F1D7}">
-              <ma14:placeholderFlag xmlns:ma14="http://schemas.microsoft.com/office/mac/drawingml/2011/main" xmlns="" val="1"/>
+              <ma14:placeholderFlag xmlns="" xmlns:ma14="http://schemas.microsoft.com/office/mac/drawingml/2011/main" val="1"/>
             </a:ext>
           </a:extLst>
         </p:spPr>
@@ -24611,7 +24611,7 @@
           <a:p>
             <a:fld id="{E76F26E0-2ED5-1B4C-9D44-9364A5F1EF5B}" type="datetimeFigureOut">
               <a:rPr lang="en-US" smtClean="0"/>
-              <a:t>12/14/20</a:t>
+              <a:t>12/22/20</a:t>
             </a:fld>
             <a:endParaRPr lang="en-US"/>
           </a:p>
@@ -24702,7 +24702,7 @@
               </a14:hiddenLine>
             </a:ext>
             <a:ext uri="{FAA26D3D-D897-4be2-8F04-BA451C77F1D7}">
-              <ma14:placeholderFlag xmlns:ma14="http://schemas.microsoft.com/office/mac/drawingml/2011/main" xmlns="" val="1"/>
+              <ma14:placeholderFlag xmlns="" xmlns:ma14="http://schemas.microsoft.com/office/mac/drawingml/2011/main" val="1"/>
             </a:ext>
           </a:extLst>
         </p:spPr>
@@ -24926,7 +24926,7 @@
               </a14:hiddenLine>
             </a:ext>
             <a:ext uri="{FAA26D3D-D897-4be2-8F04-BA451C77F1D7}">
-              <ma14:placeholderFlag xmlns:ma14="http://schemas.microsoft.com/office/mac/drawingml/2011/main" xmlns="" val="1"/>
+              <ma14:placeholderFlag xmlns="" xmlns:ma14="http://schemas.microsoft.com/office/mac/drawingml/2011/main" val="1"/>
             </a:ext>
           </a:extLst>
         </p:spPr>
@@ -28122,15 +28122,7 @@
             </a:pPr>
             <a:r>
               <a:rPr lang="en-US" altLang="en-US" dirty="0"/>
-              <a:t>Observed reading </a:t>
-            </a:r>
-            <a:r>
-              <a:rPr lang="en-US" altLang="en-US" dirty="0" err="1"/>
-              <a:t>problem..what</a:t>
-            </a:r>
-            <a:r>
-              <a:rPr lang="en-US" altLang="en-US" dirty="0"/>
-              <a:t> is the source?</a:t>
+              <a:t>Observed reading problem. What is the source?</a:t>
             </a:r>
           </a:p>
           <a:p>
@@ -30409,7 +30401,7 @@
           <a:graphicData uri="http://schemas.openxmlformats.org/presentationml/2006/ole">
             <mc:AlternateContent xmlns:mc="http://schemas.openxmlformats.org/markup-compatibility/2006">
               <mc:Choice xmlns:v="urn:schemas-microsoft-com:vml" Requires="v">
-                <p:oleObj spid="_x0000_s1093" name="Document" r:id="rId3" imgW="5625893" imgH="2895493" progId="Word.Document.12">
+                <p:oleObj spid="_x0000_s1095" name="Document" r:id="rId3" imgW="5625893" imgH="2895493" progId="Word.Document.12">
                   <p:embed/>
                 </p:oleObj>
               </mc:Choice>

</xml_diff>